<commit_message>
Modifica powerpoint con aggiunta di foto e testo
</commit_message>
<xml_diff>
--- a/tesina/Tesina Fusco Alberto.ppt.pptx
+++ b/tesina/Tesina Fusco Alberto.ppt.pptx
@@ -5324,7 +5324,7 @@
       </p:sp>
       <p:pic>
         <p:nvPicPr>
-          <p:cNvPr id="12293" name="Immagine 6"/>
+          <p:cNvPr id="12294" name="Immagine 9"/>
           <p:cNvPicPr>
             <a:picLocks noChangeAspect="1" noChangeArrowheads="1"/>
           </p:cNvPicPr>
@@ -5345,8 +5345,8 @@
         </p:blipFill>
         <p:spPr bwMode="auto">
           <a:xfrm>
-            <a:off x="5148263" y="1263650"/>
-            <a:ext cx="3024187" cy="2619375"/>
+            <a:off x="5508104" y="4251000"/>
+            <a:ext cx="3455987" cy="2607000"/>
           </a:xfrm>
           <a:prstGeom prst="rect">
             <a:avLst/>
@@ -5378,13 +5378,13 @@
       </p:pic>
       <p:pic>
         <p:nvPicPr>
-          <p:cNvPr id="12294" name="Immagine 9"/>
+          <p:cNvPr id="2" name="Immagine 1"/>
           <p:cNvPicPr>
-            <a:picLocks noChangeAspect="1" noChangeArrowheads="1"/>
+            <a:picLocks noChangeAspect="1"/>
           </p:cNvPicPr>
           <p:nvPr/>
         </p:nvPicPr>
-        <p:blipFill>
+        <p:blipFill rotWithShape="1">
           <a:blip r:embed="rId3">
             <a:extLst>
               <a:ext uri="{28A0092B-C50C-407E-A947-70E740481C1C}">
@@ -5392,42 +5392,17 @@
               </a:ext>
             </a:extLst>
           </a:blip>
-          <a:srcRect/>
-          <a:stretch>
-            <a:fillRect/>
-          </a:stretch>
+          <a:srcRect l="3380" t="4640" r="2121" b="3266"/>
+          <a:stretch/>
         </p:blipFill>
-        <p:spPr bwMode="auto">
+        <p:spPr>
           <a:xfrm>
-            <a:off x="5148263" y="4052888"/>
-            <a:ext cx="3455987" cy="2533650"/>
+            <a:off x="5220072" y="1124744"/>
+            <a:ext cx="3494878" cy="3122092"/>
           </a:xfrm>
           <a:prstGeom prst="rect">
             <a:avLst/>
           </a:prstGeom>
-          <a:noFill/>
-          <a:ln>
-            <a:noFill/>
-          </a:ln>
-          <a:extLst>
-            <a:ext uri="{909E8E84-426E-40DD-AFC4-6F175D3DCCD1}">
-              <a14:hiddenFill xmlns:a14="http://schemas.microsoft.com/office/drawing/2010/main">
-                <a:solidFill>
-                  <a:srgbClr val="FFFFFF"/>
-                </a:solidFill>
-              </a14:hiddenFill>
-            </a:ext>
-            <a:ext uri="{91240B29-F687-4F45-9708-019B960494DF}">
-              <a14:hiddenLine xmlns:a14="http://schemas.microsoft.com/office/drawing/2010/main" w="9525">
-                <a:solidFill>
-                  <a:srgbClr val="000000"/>
-                </a:solidFill>
-                <a:miter lim="800000"/>
-                <a:headEnd/>
-                <a:tailEnd/>
-              </a14:hiddenLine>
-            </a:ext>
-          </a:extLst>
         </p:spPr>
       </p:pic>
     </p:spTree>
@@ -6516,8 +6491,8 @@
         </p:nvSpPr>
         <p:spPr>
           <a:xfrm>
-            <a:off x="468313" y="1187450"/>
-            <a:ext cx="5249935" cy="5793653"/>
+            <a:off x="107504" y="1178398"/>
+            <a:ext cx="5327823" cy="5793653"/>
           </a:xfrm>
         </p:spPr>
         <p:txBody>
@@ -6757,41 +6732,36 @@
           </a:p>
         </p:txBody>
       </p:sp>
-      <p:sp>
-        <p:nvSpPr>
-          <p:cNvPr id="3" name="CasellaDiTesto 2"/>
-          <p:cNvSpPr txBox="1"/>
+      <p:pic>
+        <p:nvPicPr>
+          <p:cNvPr id="2" name="Immagine 1"/>
+          <p:cNvPicPr>
+            <a:picLocks noChangeAspect="1"/>
+          </p:cNvPicPr>
           <p:nvPr/>
-        </p:nvSpPr>
+        </p:nvPicPr>
+        <p:blipFill>
+          <a:blip r:embed="rId2">
+            <a:extLst>
+              <a:ext uri="{28A0092B-C50C-407E-A947-70E740481C1C}">
+                <a14:useLocalDpi xmlns:a14="http://schemas.microsoft.com/office/drawing/2010/main" val="0"/>
+              </a:ext>
+            </a:extLst>
+          </a:blip>
+          <a:stretch>
+            <a:fillRect/>
+          </a:stretch>
+        </p:blipFill>
         <p:spPr>
           <a:xfrm>
-            <a:off x="5575553" y="2791491"/>
-            <a:ext cx="3568447" cy="923330"/>
+            <a:off x="5030092" y="2135075"/>
+            <a:ext cx="4073057" cy="3370488"/>
           </a:xfrm>
           <a:prstGeom prst="rect">
             <a:avLst/>
           </a:prstGeom>
-          <a:noFill/>
         </p:spPr>
-        <p:txBody>
-          <a:bodyPr wrap="square" rtlCol="0">
-            <a:spAutoFit/>
-          </a:bodyPr>
-          <a:lstStyle/>
-          <a:p>
-            <a:pPr algn="l"/>
-            <a:r>
-              <a:rPr lang="it-IT" dirty="0"/>
-              <a:t>INSERIRE SCHEMA IDRAULICO FATTO IN </a:t>
-            </a:r>
-            <a:r>
-              <a:rPr lang="it-IT" dirty="0" err="1"/>
-              <a:t>AUTOCAD</a:t>
-            </a:r>
-            <a:endParaRPr lang="it-IT" dirty="0"/>
-          </a:p>
-        </p:txBody>
-      </p:sp>
+      </p:pic>
     </p:spTree>
   </p:cSld>
   <p:clrMapOvr>

</xml_diff>